<commit_message>
updated diagram and related text
</commit_message>
<xml_diff>
--- a/Eager/paper/figure_designs.pptx
+++ b/Eager/paper/figure_designs.pptx
@@ -289,7 +289,7 @@
           <a:p>
             <a:fld id="{BA2525F1-6A85-1A4B-AC36-5BBBCEC4E866}" type="datetimeFigureOut">
               <a:rPr lang="en-US" smtClean="0"/>
-              <a:t>4/29/14</a:t>
+              <a:t>7/24/14</a:t>
             </a:fld>
             <a:endParaRPr lang="en-US"/>
           </a:p>
@@ -459,7 +459,7 @@
           <a:p>
             <a:fld id="{BA2525F1-6A85-1A4B-AC36-5BBBCEC4E866}" type="datetimeFigureOut">
               <a:rPr lang="en-US" smtClean="0"/>
-              <a:t>4/29/14</a:t>
+              <a:t>7/24/14</a:t>
             </a:fld>
             <a:endParaRPr lang="en-US"/>
           </a:p>
@@ -639,7 +639,7 @@
           <a:p>
             <a:fld id="{BA2525F1-6A85-1A4B-AC36-5BBBCEC4E866}" type="datetimeFigureOut">
               <a:rPr lang="en-US" smtClean="0"/>
-              <a:t>4/29/14</a:t>
+              <a:t>7/24/14</a:t>
             </a:fld>
             <a:endParaRPr lang="en-US"/>
           </a:p>
@@ -809,7 +809,7 @@
           <a:p>
             <a:fld id="{BA2525F1-6A85-1A4B-AC36-5BBBCEC4E866}" type="datetimeFigureOut">
               <a:rPr lang="en-US" smtClean="0"/>
-              <a:t>4/29/14</a:t>
+              <a:t>7/24/14</a:t>
             </a:fld>
             <a:endParaRPr lang="en-US"/>
           </a:p>
@@ -1055,7 +1055,7 @@
           <a:p>
             <a:fld id="{BA2525F1-6A85-1A4B-AC36-5BBBCEC4E866}" type="datetimeFigureOut">
               <a:rPr lang="en-US" smtClean="0"/>
-              <a:t>4/29/14</a:t>
+              <a:t>7/24/14</a:t>
             </a:fld>
             <a:endParaRPr lang="en-US"/>
           </a:p>
@@ -1343,7 +1343,7 @@
           <a:p>
             <a:fld id="{BA2525F1-6A85-1A4B-AC36-5BBBCEC4E866}" type="datetimeFigureOut">
               <a:rPr lang="en-US" smtClean="0"/>
-              <a:t>4/29/14</a:t>
+              <a:t>7/24/14</a:t>
             </a:fld>
             <a:endParaRPr lang="en-US"/>
           </a:p>
@@ -1765,7 +1765,7 @@
           <a:p>
             <a:fld id="{BA2525F1-6A85-1A4B-AC36-5BBBCEC4E866}" type="datetimeFigureOut">
               <a:rPr lang="en-US" smtClean="0"/>
-              <a:t>4/29/14</a:t>
+              <a:t>7/24/14</a:t>
             </a:fld>
             <a:endParaRPr lang="en-US"/>
           </a:p>
@@ -1883,7 +1883,7 @@
           <a:p>
             <a:fld id="{BA2525F1-6A85-1A4B-AC36-5BBBCEC4E866}" type="datetimeFigureOut">
               <a:rPr lang="en-US" smtClean="0"/>
-              <a:t>4/29/14</a:t>
+              <a:t>7/24/14</a:t>
             </a:fld>
             <a:endParaRPr lang="en-US"/>
           </a:p>
@@ -1978,7 +1978,7 @@
           <a:p>
             <a:fld id="{BA2525F1-6A85-1A4B-AC36-5BBBCEC4E866}" type="datetimeFigureOut">
               <a:rPr lang="en-US" smtClean="0"/>
-              <a:t>4/29/14</a:t>
+              <a:t>7/24/14</a:t>
             </a:fld>
             <a:endParaRPr lang="en-US"/>
           </a:p>
@@ -2255,7 +2255,7 @@
           <a:p>
             <a:fld id="{BA2525F1-6A85-1A4B-AC36-5BBBCEC4E866}" type="datetimeFigureOut">
               <a:rPr lang="en-US" smtClean="0"/>
-              <a:t>4/29/14</a:t>
+              <a:t>7/24/14</a:t>
             </a:fld>
             <a:endParaRPr lang="en-US"/>
           </a:p>
@@ -2508,7 +2508,7 @@
           <a:p>
             <a:fld id="{BA2525F1-6A85-1A4B-AC36-5BBBCEC4E866}" type="datetimeFigureOut">
               <a:rPr lang="en-US" smtClean="0"/>
-              <a:t>4/29/14</a:t>
+              <a:t>7/24/14</a:t>
             </a:fld>
             <a:endParaRPr lang="en-US"/>
           </a:p>
@@ -2721,7 +2721,7 @@
           <a:p>
             <a:fld id="{BA2525F1-6A85-1A4B-AC36-5BBBCEC4E866}" type="datetimeFigureOut">
               <a:rPr lang="en-US" smtClean="0"/>
-              <a:t>4/29/14</a:t>
+              <a:t>7/24/14</a:t>
             </a:fld>
             <a:endParaRPr lang="en-US"/>
           </a:p>
@@ -3259,7 +3259,22 @@
               <a:pPr algn="ctr"/>
               <a:r>
                 <a:rPr lang="en-US" sz="1400" dirty="0" smtClean="0"/>
-                <a:t>API Deployment Coordinator</a:t>
+                <a:t>API Deployment </a:t>
+              </a:r>
+              <a:r>
+                <a:rPr lang="en-US" sz="1400" dirty="0" smtClean="0"/>
+                <a:t>Coordinator</a:t>
+              </a:r>
+            </a:p>
+            <a:p>
+              <a:pPr algn="ctr"/>
+              <a:endParaRPr lang="en-US" sz="1400" dirty="0"/>
+            </a:p>
+            <a:p>
+              <a:pPr algn="ctr"/>
+              <a:r>
+                <a:rPr lang="en-US" sz="1400" dirty="0" smtClean="0"/>
+                <a:t>(Policy Language)</a:t>
               </a:r>
               <a:endParaRPr lang="en-US" sz="1400" dirty="0"/>
             </a:p>
@@ -4285,6 +4300,193 @@
           </p:style>
         </p:cxnSp>
       </p:grpSp>
+      <p:cxnSp>
+        <p:nvCxnSpPr>
+          <p:cNvPr id="12" name="Straight Connector 11"/>
+          <p:cNvCxnSpPr/>
+          <p:nvPr/>
+        </p:nvCxnSpPr>
+        <p:spPr>
+          <a:xfrm>
+            <a:off x="6746394" y="621800"/>
+            <a:ext cx="0" cy="6196510"/>
+          </a:xfrm>
+          <a:prstGeom prst="line">
+            <a:avLst/>
+          </a:prstGeom>
+          <a:ln w="34925">
+            <a:solidFill>
+              <a:schemeClr val="accent6">
+                <a:lumMod val="75000"/>
+              </a:schemeClr>
+            </a:solidFill>
+          </a:ln>
+        </p:spPr>
+        <p:style>
+          <a:lnRef idx="2">
+            <a:schemeClr val="accent1"/>
+          </a:lnRef>
+          <a:fillRef idx="0">
+            <a:schemeClr val="accent1"/>
+          </a:fillRef>
+          <a:effectRef idx="1">
+            <a:schemeClr val="accent1"/>
+          </a:effectRef>
+          <a:fontRef idx="minor">
+            <a:schemeClr val="tx1"/>
+          </a:fontRef>
+        </p:style>
+      </p:cxnSp>
+      <p:sp>
+        <p:nvSpPr>
+          <p:cNvPr id="18" name="Left-Right Arrow 17"/>
+          <p:cNvSpPr/>
+          <p:nvPr/>
+        </p:nvSpPr>
+        <p:spPr>
+          <a:xfrm>
+            <a:off x="227263" y="687945"/>
+            <a:ext cx="6358643" cy="582112"/>
+          </a:xfrm>
+          <a:prstGeom prst="leftRightArrow">
+            <a:avLst/>
+          </a:prstGeom>
+          <a:solidFill>
+            <a:schemeClr val="accent6"/>
+          </a:solidFill>
+          <a:ln>
+            <a:solidFill>
+              <a:srgbClr val="E46C0A"/>
+            </a:solidFill>
+          </a:ln>
+        </p:spPr>
+        <p:style>
+          <a:lnRef idx="1">
+            <a:schemeClr val="accent1"/>
+          </a:lnRef>
+          <a:fillRef idx="3">
+            <a:schemeClr val="accent1"/>
+          </a:fillRef>
+          <a:effectRef idx="2">
+            <a:schemeClr val="accent1"/>
+          </a:effectRef>
+          <a:fontRef idx="minor">
+            <a:schemeClr val="lt1"/>
+          </a:fontRef>
+        </p:style>
+        <p:txBody>
+          <a:bodyPr rtlCol="0" anchor="ctr"/>
+          <a:lstStyle/>
+          <a:p>
+            <a:pPr algn="ctr"/>
+            <a:r>
+              <a:rPr lang="en-US" sz="1600" dirty="0" smtClean="0"/>
+              <a:t>Deployment Control</a:t>
+            </a:r>
+            <a:endParaRPr lang="en-US" sz="1600" dirty="0"/>
+          </a:p>
+        </p:txBody>
+      </p:sp>
+      <p:sp>
+        <p:nvSpPr>
+          <p:cNvPr id="38" name="Left-Right Arrow 37"/>
+          <p:cNvSpPr/>
+          <p:nvPr/>
+        </p:nvSpPr>
+        <p:spPr>
+          <a:xfrm>
+            <a:off x="6912173" y="687945"/>
+            <a:ext cx="2031300" cy="582112"/>
+          </a:xfrm>
+          <a:prstGeom prst="leftRightArrow">
+            <a:avLst/>
+          </a:prstGeom>
+          <a:solidFill>
+            <a:srgbClr val="F79646"/>
+          </a:solidFill>
+          <a:ln>
+            <a:solidFill>
+              <a:srgbClr val="E46C0A"/>
+            </a:solidFill>
+          </a:ln>
+        </p:spPr>
+        <p:style>
+          <a:lnRef idx="1">
+            <a:schemeClr val="accent1"/>
+          </a:lnRef>
+          <a:fillRef idx="3">
+            <a:schemeClr val="accent1"/>
+          </a:fillRef>
+          <a:effectRef idx="2">
+            <a:schemeClr val="accent1"/>
+          </a:effectRef>
+          <a:fontRef idx="minor">
+            <a:schemeClr val="lt1"/>
+          </a:fontRef>
+        </p:style>
+        <p:txBody>
+          <a:bodyPr rtlCol="0" anchor="ctr"/>
+          <a:lstStyle/>
+          <a:p>
+            <a:pPr algn="ctr"/>
+            <a:r>
+              <a:rPr lang="en-US" sz="1600" dirty="0" smtClean="0"/>
+              <a:t>Run-time Control</a:t>
+            </a:r>
+            <a:endParaRPr lang="en-US" sz="1600" dirty="0"/>
+          </a:p>
+        </p:txBody>
+      </p:sp>
+      <p:sp>
+        <p:nvSpPr>
+          <p:cNvPr id="21" name="Snip Single Corner Rectangle 20"/>
+          <p:cNvSpPr/>
+          <p:nvPr/>
+        </p:nvSpPr>
+        <p:spPr>
+          <a:xfrm>
+            <a:off x="1269908" y="1759561"/>
+            <a:ext cx="685705" cy="821952"/>
+          </a:xfrm>
+          <a:prstGeom prst="snip1Rect">
+            <a:avLst/>
+          </a:prstGeom>
+          <a:solidFill>
+            <a:schemeClr val="bg1">
+              <a:lumMod val="85000"/>
+            </a:schemeClr>
+          </a:solidFill>
+          <a:ln>
+            <a:noFill/>
+          </a:ln>
+        </p:spPr>
+        <p:style>
+          <a:lnRef idx="1">
+            <a:schemeClr val="accent1"/>
+          </a:lnRef>
+          <a:fillRef idx="3">
+            <a:schemeClr val="accent1"/>
+          </a:fillRef>
+          <a:effectRef idx="2">
+            <a:schemeClr val="accent1"/>
+          </a:effectRef>
+          <a:fontRef idx="minor">
+            <a:schemeClr val="lt1"/>
+          </a:fontRef>
+        </p:style>
+        <p:txBody>
+          <a:bodyPr rtlCol="0" anchor="ctr"/>
+          <a:lstStyle/>
+          <a:p>
+            <a:pPr algn="ctr"/>
+            <a:r>
+              <a:rPr lang="en-US" sz="1400" dirty="0" smtClean="0"/>
+              <a:t>API Specs</a:t>
+            </a:r>
+            <a:endParaRPr lang="en-US" sz="1400" dirty="0"/>
+          </a:p>
+        </p:txBody>
+      </p:sp>
     </p:spTree>
     <p:extLst>
       <p:ext uri="{BB962C8B-B14F-4D97-AF65-F5344CB8AC3E}">

</xml_diff>